<commit_message>
Added some points to the presentation.  Final cleaning and creating of data sets (train and test), should be alot cleaner than before (nearly no NaNs for new features). Prediction still sucks, tried some normalization (I think), sucks even more.
</commit_message>
<xml_diff>
--- a/Leo Präsi.pptx
+++ b/Leo Präsi.pptx
@@ -205,7 +205,7 @@
           <a:p>
             <a:fld id="{A2DC66F6-55EB-4342-9B8C-4BD2F39E48B7}" type="datetimeFigureOut">
               <a:rPr lang="de-DE" smtClean="0"/>
-              <a:t>11.08.2018</a:t>
+              <a:t>12.08.2018</a:t>
             </a:fld>
             <a:endParaRPr lang="de-DE"/>
           </a:p>
@@ -744,7 +744,7 @@
           <a:p>
             <a:fld id="{009F598A-B0D2-435A-8683-0100206BDD80}" type="datetimeFigureOut">
               <a:rPr lang="de-DE" smtClean="0"/>
-              <a:t>11.08.2018</a:t>
+              <a:t>12.08.2018</a:t>
             </a:fld>
             <a:endParaRPr lang="de-DE"/>
           </a:p>
@@ -922,7 +922,7 @@
           <a:p>
             <a:fld id="{009F598A-B0D2-435A-8683-0100206BDD80}" type="datetimeFigureOut">
               <a:rPr lang="de-DE" smtClean="0"/>
-              <a:t>11.08.2018</a:t>
+              <a:t>12.08.2018</a:t>
             </a:fld>
             <a:endParaRPr lang="de-DE"/>
           </a:p>
@@ -1539,7 +1539,7 @@
           <a:p>
             <a:fld id="{009F598A-B0D2-435A-8683-0100206BDD80}" type="datetimeFigureOut">
               <a:rPr lang="de-DE" smtClean="0"/>
-              <a:t>11.08.2018</a:t>
+              <a:t>12.08.2018</a:t>
             </a:fld>
             <a:endParaRPr lang="de-DE"/>
           </a:p>
@@ -1768,7 +1768,7 @@
           <a:p>
             <a:fld id="{009F598A-B0D2-435A-8683-0100206BDD80}" type="datetimeFigureOut">
               <a:rPr lang="de-DE" smtClean="0"/>
-              <a:t>11.08.2018</a:t>
+              <a:t>12.08.2018</a:t>
             </a:fld>
             <a:endParaRPr lang="de-DE"/>
           </a:p>
@@ -2132,7 +2132,7 @@
           <a:p>
             <a:fld id="{009F598A-B0D2-435A-8683-0100206BDD80}" type="datetimeFigureOut">
               <a:rPr lang="de-DE" smtClean="0"/>
-              <a:t>11.08.2018</a:t>
+              <a:t>12.08.2018</a:t>
             </a:fld>
             <a:endParaRPr lang="de-DE"/>
           </a:p>
@@ -2249,7 +2249,7 @@
           <a:p>
             <a:fld id="{009F598A-B0D2-435A-8683-0100206BDD80}" type="datetimeFigureOut">
               <a:rPr lang="de-DE" smtClean="0"/>
-              <a:t>11.08.2018</a:t>
+              <a:t>12.08.2018</a:t>
             </a:fld>
             <a:endParaRPr lang="de-DE"/>
           </a:p>
@@ -2344,7 +2344,7 @@
           <a:p>
             <a:fld id="{009F598A-B0D2-435A-8683-0100206BDD80}" type="datetimeFigureOut">
               <a:rPr lang="de-DE" smtClean="0"/>
-              <a:t>11.08.2018</a:t>
+              <a:t>12.08.2018</a:t>
             </a:fld>
             <a:endParaRPr lang="de-DE"/>
           </a:p>
@@ -2619,7 +2619,7 @@
           <a:p>
             <a:fld id="{009F598A-B0D2-435A-8683-0100206BDD80}" type="datetimeFigureOut">
               <a:rPr lang="de-DE" smtClean="0"/>
-              <a:t>11.08.2018</a:t>
+              <a:t>12.08.2018</a:t>
             </a:fld>
             <a:endParaRPr lang="de-DE"/>
           </a:p>
@@ -2871,7 +2871,7 @@
           <a:p>
             <a:fld id="{009F598A-B0D2-435A-8683-0100206BDD80}" type="datetimeFigureOut">
               <a:rPr lang="de-DE" smtClean="0"/>
-              <a:t>11.08.2018</a:t>
+              <a:t>12.08.2018</a:t>
             </a:fld>
             <a:endParaRPr lang="de-DE"/>
           </a:p>
@@ -3082,7 +3082,7 @@
           <a:p>
             <a:fld id="{009F598A-B0D2-435A-8683-0100206BDD80}" type="datetimeFigureOut">
               <a:rPr lang="de-DE" smtClean="0"/>
-              <a:t>11.08.2018</a:t>
+              <a:t>12.08.2018</a:t>
             </a:fld>
             <a:endParaRPr lang="de-DE"/>
           </a:p>
@@ -4639,21 +4639,21 @@
             <a:pPr lvl="1"/>
             <a:r>
               <a:rPr lang="en-US" dirty="0"/>
-              <a:t>Ad advertises a bargain</a:t>
+              <a:t>Ad advertises a good deal</a:t>
             </a:r>
           </a:p>
           <a:p>
             <a:pPr lvl="1"/>
             <a:r>
               <a:rPr lang="en-US" dirty="0"/>
-              <a:t>Ad advertises a product that belongs to an earlier buy</a:t>
+              <a:t>Ad advertises a product that complements an earlier buy</a:t>
             </a:r>
           </a:p>
           <a:p>
             <a:pPr lvl="1"/>
             <a:r>
               <a:rPr lang="en-US" dirty="0"/>
-              <a:t>When they have a lot of money to spend (start of a month?)</a:t>
+              <a:t>When people have a lot of money to spend (start of a month?)</a:t>
             </a:r>
           </a:p>
           <a:p>
@@ -5266,41 +5266,55 @@
           <a:p>
             <a:r>
               <a:rPr lang="en-US" dirty="0"/>
-              <a:t>Assumption 1: Bridge that minimize air-line distance is actually used</a:t>
+              <a:t>Many </a:t>
+            </a:r>
+            <a:r>
+              <a:rPr lang="en-US" dirty="0" err="1"/>
+              <a:t>NaNs</a:t>
+            </a:r>
+            <a:r>
+              <a:rPr lang="en-US" dirty="0"/>
+              <a:t> in new features due to missing data / to little data</a:t>
             </a:r>
           </a:p>
           <a:p>
             <a:pPr lvl="1"/>
             <a:r>
               <a:rPr lang="en-US" dirty="0"/>
-              <a:t>Different route</a:t>
-            </a:r>
+              <a:t>E.g. </a:t>
+            </a:r>
+            <a:r>
+              <a:rPr lang="en-US" dirty="0" err="1"/>
+              <a:t>average_money_spent_cate</a:t>
+            </a:r>
+            <a:r>
+              <a:rPr lang="en-US" dirty="0"/>
+              <a:t> in test set 98% </a:t>
+            </a:r>
+            <a:r>
+              <a:rPr lang="en-US" dirty="0" err="1"/>
+              <a:t>NaNs</a:t>
+            </a:r>
+            <a:endParaRPr lang="en-US" dirty="0"/>
           </a:p>
           <a:p>
             <a:pPr lvl="1"/>
             <a:r>
               <a:rPr lang="en-US" dirty="0"/>
-              <a:t>Non-linear route</a:t>
+              <a:t>Many users did not shop in all categories / missing data</a:t>
             </a:r>
           </a:p>
           <a:p>
             <a:r>
               <a:rPr lang="en-US" dirty="0"/>
-              <a:t>Assumption 2: air-line distance ratio represents real inner-city to outer-city trip distance ratio</a:t>
+              <a:t>Train and test set were sampled</a:t>
             </a:r>
           </a:p>
           <a:p>
             <a:pPr lvl="1"/>
             <a:r>
               <a:rPr lang="en-US" dirty="0"/>
-              <a:t>Different shape of route in city vs out of city</a:t>
-            </a:r>
-          </a:p>
-          <a:p>
-            <a:pPr lvl="1"/>
-            <a:r>
-              <a:rPr lang="en-US" dirty="0"/>
-              <a:t>Extra destinations possible</a:t>
+              <a:t>A very active user might be appear very inactive</a:t>
             </a:r>
           </a:p>
         </p:txBody>
@@ -5548,55 +5562,6 @@
                                           <p:spTgt spid="3">
                                             <p:txEl>
                                               <p:pRg st="4" end="4"/>
-                                            </p:txEl>
-                                          </p:spTgt>
-                                        </p:tgtEl>
-                                        <p:attrNameLst>
-                                          <p:attrName>style.visibility</p:attrName>
-                                        </p:attrNameLst>
-                                      </p:cBhvr>
-                                      <p:to>
-                                        <p:strVal val="visible"/>
-                                      </p:to>
-                                    </p:set>
-                                  </p:childTnLst>
-                                </p:cTn>
-                              </p:par>
-                            </p:childTnLst>
-                          </p:cTn>
-                        </p:par>
-                      </p:childTnLst>
-                    </p:cTn>
-                  </p:par>
-                  <p:par>
-                    <p:cTn id="23" fill="hold">
-                      <p:stCondLst>
-                        <p:cond delay="indefinite"/>
-                      </p:stCondLst>
-                      <p:childTnLst>
-                        <p:par>
-                          <p:cTn id="24" fill="hold">
-                            <p:stCondLst>
-                              <p:cond delay="0"/>
-                            </p:stCondLst>
-                            <p:childTnLst>
-                              <p:par>
-                                <p:cTn id="25" presetID="1" presetClass="entr" presetSubtype="0" fill="hold" nodeType="clickEffect">
-                                  <p:stCondLst>
-                                    <p:cond delay="0"/>
-                                  </p:stCondLst>
-                                  <p:childTnLst>
-                                    <p:set>
-                                      <p:cBhvr>
-                                        <p:cTn id="26" dur="1" fill="hold">
-                                          <p:stCondLst>
-                                            <p:cond delay="0"/>
-                                          </p:stCondLst>
-                                        </p:cTn>
-                                        <p:tgtEl>
-                                          <p:spTgt spid="3">
-                                            <p:txEl>
-                                              <p:pRg st="5" end="5"/>
                                             </p:txEl>
                                           </p:spTgt>
                                         </p:tgtEl>

</xml_diff>